<commit_message>
Final deck for CRineta
</commit_message>
<xml_diff>
--- a/PowerShell/KDahlby.201102.CRineta.PowerShell.pptx
+++ b/PowerShell/KDahlby.201102.CRineta.PowerShell.pptx
@@ -5064,7 +5064,9 @@
         </p:nvSpPr>
         <p:spPr/>
         <p:txBody>
-          <a:bodyPr/>
+          <a:bodyPr>
+            <a:normAutofit/>
+          </a:bodyPr>
           <a:lstStyle/>
           <a:p>
             <a:r>
@@ -5107,7 +5109,7 @@
               <a:t>Interlude: </a:t>
             </a:r>
             <a:r>
-              <a:rPr lang="en-US" smtClean="0"/>
+              <a:rPr lang="en-US" dirty="0" err="1" smtClean="0"/>
               <a:t>NuGet</a:t>
             </a:r>
             <a:endParaRPr lang="en-US" dirty="0" smtClean="0"/>
@@ -5115,7 +5117,7 @@
           <a:p>
             <a:r>
               <a:rPr lang="en-US" dirty="0" smtClean="0"/>
-              <a:t>Compiled: </a:t>
+              <a:t>Compiled </a:t>
             </a:r>
             <a:r>
               <a:rPr lang="en-US" dirty="0" err="1" smtClean="0"/>
@@ -5123,7 +5125,11 @@
             </a:r>
             <a:r>
               <a:rPr lang="en-US" dirty="0" smtClean="0"/>
-              <a:t> and Snap-ins</a:t>
+              <a:t>, Drive Providers, </a:t>
+            </a:r>
+            <a:r>
+              <a:rPr lang="en-US" dirty="0" smtClean="0"/>
+              <a:t>Snap-ins</a:t>
             </a:r>
           </a:p>
           <a:p>

</xml_diff>